<commit_message>
initial for module 4
</commit_message>
<xml_diff>
--- a/Modules/03.advanced/slides.pptx
+++ b/Modules/03.advanced/slides.pptx
@@ -9451,15 +9451,33 @@
                                   </p:childTnLst>
                                 </p:cTn>
                               </p:par>
+                            </p:childTnLst>
+                          </p:cTn>
+                        </p:par>
+                      </p:childTnLst>
+                    </p:cTn>
+                  </p:par>
+                  <p:par>
+                    <p:cTn id="37" fill="hold">
+                      <p:stCondLst>
+                        <p:cond delay="indefinite"/>
+                      </p:stCondLst>
+                      <p:childTnLst>
+                        <p:par>
+                          <p:cTn id="38" fill="hold">
+                            <p:stCondLst>
+                              <p:cond delay="0"/>
+                            </p:stCondLst>
+                            <p:childTnLst>
                               <p:par>
-                                <p:cTn id="37" presetID="1" presetClass="entr" presetSubtype="0" fill="hold" grpId="0" nodeType="withEffect">
+                                <p:cTn id="39" presetID="1" presetClass="entr" presetSubtype="0" fill="hold" grpId="0" nodeType="clickEffect">
                                   <p:stCondLst>
                                     <p:cond delay="0"/>
                                   </p:stCondLst>
                                   <p:childTnLst>
                                     <p:set>
                                       <p:cBhvr>
-                                        <p:cTn id="38" dur="1" fill="hold">
+                                        <p:cTn id="40" dur="1" fill="hold">
                                           <p:stCondLst>
                                             <p:cond delay="0"/>
                                           </p:stCondLst>
@@ -9485,26 +9503,26 @@
                     </p:cTn>
                   </p:par>
                   <p:par>
-                    <p:cTn id="39" fill="hold">
+                    <p:cTn id="41" fill="hold">
                       <p:stCondLst>
                         <p:cond delay="indefinite"/>
                       </p:stCondLst>
                       <p:childTnLst>
                         <p:par>
-                          <p:cTn id="40" fill="hold">
+                          <p:cTn id="42" fill="hold">
                             <p:stCondLst>
                               <p:cond delay="0"/>
                             </p:stCondLst>
                             <p:childTnLst>
                               <p:par>
-                                <p:cTn id="41" presetID="1" presetClass="entr" presetSubtype="0" fill="hold" nodeType="clickEffect">
+                                <p:cTn id="43" presetID="1" presetClass="entr" presetSubtype="0" fill="hold" nodeType="clickEffect">
                                   <p:stCondLst>
                                     <p:cond delay="0"/>
                                   </p:stCondLst>
                                   <p:childTnLst>
                                     <p:set>
                                       <p:cBhvr>
-                                        <p:cTn id="42" dur="1" fill="hold">
+                                        <p:cTn id="44" dur="1" fill="hold">
                                           <p:stCondLst>
                                             <p:cond delay="0"/>
                                           </p:stCondLst>
@@ -9524,14 +9542,14 @@
                                 </p:cTn>
                               </p:par>
                               <p:par>
-                                <p:cTn id="43" presetID="10" presetClass="exit" presetSubtype="0" fill="hold" nodeType="withEffect">
+                                <p:cTn id="45" presetID="10" presetClass="exit" presetSubtype="0" fill="hold" nodeType="withEffect">
                                   <p:stCondLst>
                                     <p:cond delay="0"/>
                                   </p:stCondLst>
                                   <p:childTnLst>
                                     <p:animEffect transition="out" filter="fade">
                                       <p:cBhvr>
-                                        <p:cTn id="44" dur="500"/>
+                                        <p:cTn id="46" dur="500"/>
                                         <p:tgtEl>
                                           <p:spTgt spid="28"/>
                                         </p:tgtEl>
@@ -9539,7 +9557,7 @@
                                     </p:animEffect>
                                     <p:set>
                                       <p:cBhvr>
-                                        <p:cTn id="45" dur="1" fill="hold">
+                                        <p:cTn id="47" dur="1" fill="hold">
                                           <p:stCondLst>
                                             <p:cond delay="499"/>
                                           </p:stCondLst>
@@ -9559,14 +9577,14 @@
                                 </p:cTn>
                               </p:par>
                               <p:par>
-                                <p:cTn id="46" presetID="10" presetClass="exit" presetSubtype="0" fill="hold" nodeType="withEffect">
+                                <p:cTn id="48" presetID="10" presetClass="exit" presetSubtype="0" fill="hold" nodeType="withEffect">
                                   <p:stCondLst>
                                     <p:cond delay="0"/>
                                   </p:stCondLst>
                                   <p:childTnLst>
                                     <p:animEffect transition="out" filter="fade">
                                       <p:cBhvr>
-                                        <p:cTn id="47" dur="500"/>
+                                        <p:cTn id="49" dur="500"/>
                                         <p:tgtEl>
                                           <p:spTgt spid="29"/>
                                         </p:tgtEl>
@@ -9574,7 +9592,7 @@
                                     </p:animEffect>
                                     <p:set>
                                       <p:cBhvr>
-                                        <p:cTn id="48" dur="1" fill="hold">
+                                        <p:cTn id="50" dur="1" fill="hold">
                                           <p:stCondLst>
                                             <p:cond delay="499"/>
                                           </p:stCondLst>
@@ -9593,15 +9611,33 @@
                                   </p:childTnLst>
                                 </p:cTn>
                               </p:par>
+                            </p:childTnLst>
+                          </p:cTn>
+                        </p:par>
+                      </p:childTnLst>
+                    </p:cTn>
+                  </p:par>
+                  <p:par>
+                    <p:cTn id="51" fill="hold">
+                      <p:stCondLst>
+                        <p:cond delay="indefinite"/>
+                      </p:stCondLst>
+                      <p:childTnLst>
+                        <p:par>
+                          <p:cTn id="52" fill="hold">
+                            <p:stCondLst>
+                              <p:cond delay="0"/>
+                            </p:stCondLst>
+                            <p:childTnLst>
                               <p:par>
-                                <p:cTn id="49" presetID="10" presetClass="exit" presetSubtype="0" fill="hold" grpId="1" nodeType="withEffect">
+                                <p:cTn id="53" presetID="10" presetClass="exit" presetSubtype="0" fill="hold" grpId="1" nodeType="clickEffect">
                                   <p:stCondLst>
                                     <p:cond delay="0"/>
                                   </p:stCondLst>
                                   <p:childTnLst>
                                     <p:animEffect transition="out" filter="fade">
                                       <p:cBhvr>
-                                        <p:cTn id="50" dur="500"/>
+                                        <p:cTn id="54" dur="500"/>
                                         <p:tgtEl>
                                           <p:spTgt spid="9"/>
                                         </p:tgtEl>
@@ -9609,7 +9645,7 @@
                                     </p:animEffect>
                                     <p:set>
                                       <p:cBhvr>
-                                        <p:cTn id="51" dur="1" fill="hold">
+                                        <p:cTn id="55" dur="1" fill="hold">
                                           <p:stCondLst>
                                             <p:cond delay="499"/>
                                           </p:stCondLst>

</xml_diff>